<commit_message>
Changes for power point
</commit_message>
<xml_diff>
--- a/Class 9.pptx
+++ b/Class 9.pptx
@@ -5,12 +5,19 @@
     <p:sldMasterId id="2147483672" r:id="rId1"/>
   </p:sldMasterIdLst>
   <p:notesMasterIdLst>
-    <p:notesMasterId r:id="rId5"/>
+    <p:notesMasterId r:id="rId12"/>
   </p:notesMasterIdLst>
   <p:sldIdLst>
     <p:sldId id="256" r:id="rId2"/>
-    <p:sldId id="375" r:id="rId3"/>
-    <p:sldId id="376" r:id="rId4"/>
+    <p:sldId id="380" r:id="rId3"/>
+    <p:sldId id="379" r:id="rId4"/>
+    <p:sldId id="377" r:id="rId5"/>
+    <p:sldId id="381" r:id="rId6"/>
+    <p:sldId id="382" r:id="rId7"/>
+    <p:sldId id="383" r:id="rId8"/>
+    <p:sldId id="384" r:id="rId9"/>
+    <p:sldId id="375" r:id="rId10"/>
+    <p:sldId id="376" r:id="rId11"/>
   </p:sldIdLst>
   <p:sldSz cx="12192000" cy="6858000"/>
   <p:notesSz cx="6858000" cy="9144000"/>
@@ -199,7 +206,7 @@
           <a:p>
             <a:fld id="{91553857-FF24-F64E-8D31-96B246FE7FC7}" type="datetimeFigureOut">
               <a:rPr lang="en-US" smtClean="0"/>
-              <a:t>9/17/18</a:t>
+              <a:t>9/21/18</a:t>
             </a:fld>
             <a:endParaRPr lang="en-US"/>
           </a:p>
@@ -635,7 +642,7 @@
           <a:p>
             <a:fld id="{C42C6571-5E6A-784B-B936-D3B05221CD33}" type="datetimeFigureOut">
               <a:rPr lang="en-US" smtClean="0"/>
-              <a:t>9/17/18</a:t>
+              <a:t>9/21/18</a:t>
             </a:fld>
             <a:endParaRPr lang="en-US"/>
           </a:p>
@@ -960,7 +967,7 @@
           <a:p>
             <a:fld id="{C42C6571-5E6A-784B-B936-D3B05221CD33}" type="datetimeFigureOut">
               <a:rPr lang="en-US" smtClean="0"/>
-              <a:t>9/17/18</a:t>
+              <a:t>9/21/18</a:t>
             </a:fld>
             <a:endParaRPr lang="en-US"/>
           </a:p>
@@ -1135,7 +1142,7 @@
           <a:p>
             <a:fld id="{C42C6571-5E6A-784B-B936-D3B05221CD33}" type="datetimeFigureOut">
               <a:rPr lang="en-US" smtClean="0"/>
-              <a:t>9/17/18</a:t>
+              <a:t>9/21/18</a:t>
             </a:fld>
             <a:endParaRPr lang="en-US"/>
           </a:p>
@@ -1304,7 +1311,7 @@
           <a:p>
             <a:fld id="{C42C6571-5E6A-784B-B936-D3B05221CD33}" type="datetimeFigureOut">
               <a:rPr lang="en-US" smtClean="0"/>
-              <a:t>9/17/18</a:t>
+              <a:t>9/21/18</a:t>
             </a:fld>
             <a:endParaRPr lang="en-US"/>
           </a:p>
@@ -1576,7 +1583,7 @@
           <a:p>
             <a:fld id="{C42C6571-5E6A-784B-B936-D3B05221CD33}" type="datetimeFigureOut">
               <a:rPr lang="en-US" smtClean="0"/>
-              <a:t>9/17/18</a:t>
+              <a:t>9/21/18</a:t>
             </a:fld>
             <a:endParaRPr lang="en-US"/>
           </a:p>
@@ -1965,7 +1972,7 @@
           <a:p>
             <a:fld id="{C42C6571-5E6A-784B-B936-D3B05221CD33}" type="datetimeFigureOut">
               <a:rPr lang="en-US" smtClean="0"/>
-              <a:t>9/17/18</a:t>
+              <a:t>9/21/18</a:t>
             </a:fld>
             <a:endParaRPr lang="en-US"/>
           </a:p>
@@ -2437,7 +2444,7 @@
           <a:p>
             <a:fld id="{C42C6571-5E6A-784B-B936-D3B05221CD33}" type="datetimeFigureOut">
               <a:rPr lang="en-US" smtClean="0"/>
-              <a:t>9/17/18</a:t>
+              <a:t>9/21/18</a:t>
             </a:fld>
             <a:endParaRPr lang="en-US"/>
           </a:p>
@@ -2550,7 +2557,7 @@
           <a:p>
             <a:fld id="{C42C6571-5E6A-784B-B936-D3B05221CD33}" type="datetimeFigureOut">
               <a:rPr lang="en-US" smtClean="0"/>
-              <a:t>9/17/18</a:t>
+              <a:t>9/21/18</a:t>
             </a:fld>
             <a:endParaRPr lang="en-US"/>
           </a:p>
@@ -2640,7 +2647,7 @@
           <a:p>
             <a:fld id="{C42C6571-5E6A-784B-B936-D3B05221CD33}" type="datetimeFigureOut">
               <a:rPr lang="en-US" smtClean="0"/>
-              <a:t>9/17/18</a:t>
+              <a:t>9/21/18</a:t>
             </a:fld>
             <a:endParaRPr lang="en-US"/>
           </a:p>
@@ -2981,7 +2988,7 @@
           <a:p>
             <a:fld id="{C42C6571-5E6A-784B-B936-D3B05221CD33}" type="datetimeFigureOut">
               <a:rPr lang="en-US" smtClean="0"/>
-              <a:t>9/17/18</a:t>
+              <a:t>9/21/18</a:t>
             </a:fld>
             <a:endParaRPr lang="en-US"/>
           </a:p>
@@ -3364,7 +3371,7 @@
           <a:p>
             <a:fld id="{C42C6571-5E6A-784B-B936-D3B05221CD33}" type="datetimeFigureOut">
               <a:rPr lang="en-US" smtClean="0"/>
-              <a:t>9/17/18</a:t>
+              <a:t>9/21/18</a:t>
             </a:fld>
             <a:endParaRPr lang="en-US"/>
           </a:p>
@@ -3637,7 +3644,7 @@
           <a:p>
             <a:fld id="{C42C6571-5E6A-784B-B936-D3B05221CD33}" type="datetimeFigureOut">
               <a:rPr lang="en-US" smtClean="0"/>
-              <a:t>9/17/18</a:t>
+              <a:t>9/21/18</a:t>
             </a:fld>
             <a:endParaRPr lang="en-US"/>
           </a:p>
@@ -4207,6 +4214,134 @@
 </p:sld>
 </file>
 
+<file path=ppt/slides/slide10.xml><?xml version="1.0" encoding="utf-8"?>
+<p:sld xmlns:a="http://schemas.openxmlformats.org/drawingml/2006/main" xmlns:r="http://schemas.openxmlformats.org/officeDocument/2006/relationships" xmlns:p="http://schemas.openxmlformats.org/presentationml/2006/main">
+  <p:cSld>
+    <p:spTree>
+      <p:nvGrpSpPr>
+        <p:cNvPr id="1" name=""/>
+        <p:cNvGrpSpPr/>
+        <p:nvPr/>
+      </p:nvGrpSpPr>
+      <p:grpSpPr>
+        <a:xfrm>
+          <a:off x="0" y="0"/>
+          <a:ext cx="0" cy="0"/>
+          <a:chOff x="0" y="0"/>
+          <a:chExt cx="0" cy="0"/>
+        </a:xfrm>
+      </p:grpSpPr>
+      <p:sp>
+        <p:nvSpPr>
+          <p:cNvPr id="2" name="Title 1">
+            <a:extLst>
+              <a:ext uri="{FF2B5EF4-FFF2-40B4-BE49-F238E27FC236}">
+                <a16:creationId xmlns:a16="http://schemas.microsoft.com/office/drawing/2014/main" id="{3F871639-BB5F-F844-9FFA-3D37369566E3}"/>
+              </a:ext>
+            </a:extLst>
+          </p:cNvPr>
+          <p:cNvSpPr>
+            <a:spLocks noGrp="1"/>
+          </p:cNvSpPr>
+          <p:nvPr>
+            <p:ph type="title"/>
+          </p:nvPr>
+        </p:nvSpPr>
+        <p:spPr/>
+        <p:txBody>
+          <a:bodyPr/>
+          <a:lstStyle/>
+          <a:p>
+            <a:r>
+              <a:rPr lang="en-US" dirty="0"/>
+              <a:t>Please be able to load the following libraries</a:t>
+            </a:r>
+          </a:p>
+        </p:txBody>
+      </p:sp>
+      <p:sp>
+        <p:nvSpPr>
+          <p:cNvPr id="3" name="Content Placeholder 2">
+            <a:extLst>
+              <a:ext uri="{FF2B5EF4-FFF2-40B4-BE49-F238E27FC236}">
+                <a16:creationId xmlns:a16="http://schemas.microsoft.com/office/drawing/2014/main" id="{B0ABF65C-A12F-8442-AD8B-4984D44E4488}"/>
+              </a:ext>
+            </a:extLst>
+          </p:cNvPr>
+          <p:cNvSpPr>
+            <a:spLocks noGrp="1"/>
+          </p:cNvSpPr>
+          <p:nvPr>
+            <p:ph sz="half" idx="1"/>
+          </p:nvPr>
+        </p:nvSpPr>
+        <p:spPr/>
+        <p:txBody>
+          <a:bodyPr/>
+          <a:lstStyle/>
+          <a:p>
+            <a:r>
+              <a:rPr lang="en-US" dirty="0" err="1"/>
+              <a:t>httr</a:t>
+            </a:r>
+            <a:endParaRPr lang="en-US" dirty="0"/>
+          </a:p>
+          <a:p>
+            <a:r>
+              <a:rPr lang="en-US" dirty="0"/>
+              <a:t>Make API calls</a:t>
+            </a:r>
+          </a:p>
+        </p:txBody>
+      </p:sp>
+      <p:sp>
+        <p:nvSpPr>
+          <p:cNvPr id="4" name="Content Placeholder 3">
+            <a:extLst>
+              <a:ext uri="{FF2B5EF4-FFF2-40B4-BE49-F238E27FC236}">
+                <a16:creationId xmlns:a16="http://schemas.microsoft.com/office/drawing/2014/main" id="{BAE8C708-EB2C-4D4C-98B8-BC0BF14A8E2E}"/>
+              </a:ext>
+            </a:extLst>
+          </p:cNvPr>
+          <p:cNvSpPr>
+            <a:spLocks noGrp="1"/>
+          </p:cNvSpPr>
+          <p:nvPr>
+            <p:ph sz="half" idx="2"/>
+          </p:nvPr>
+        </p:nvSpPr>
+        <p:spPr/>
+        <p:txBody>
+          <a:bodyPr/>
+          <a:lstStyle/>
+          <a:p>
+            <a:r>
+              <a:rPr lang="en-US" dirty="0" err="1"/>
+              <a:t>jsonlite</a:t>
+            </a:r>
+            <a:endParaRPr lang="en-US" dirty="0"/>
+          </a:p>
+          <a:p>
+            <a:r>
+              <a:rPr lang="en-US" dirty="0"/>
+              <a:t>Easily load and read JSON objects in R</a:t>
+            </a:r>
+          </a:p>
+        </p:txBody>
+      </p:sp>
+    </p:spTree>
+    <p:extLst>
+      <p:ext uri="{BB962C8B-B14F-4D97-AF65-F5344CB8AC3E}">
+        <p14:creationId xmlns:p14="http://schemas.microsoft.com/office/powerpoint/2010/main" val="2995080687"/>
+      </p:ext>
+    </p:extLst>
+  </p:cSld>
+  <p:clrMapOvr>
+    <a:masterClrMapping/>
+  </p:clrMapOvr>
+</p:sld>
+</file>
+
 <file path=ppt/slides/slide2.xml><?xml version="1.0" encoding="utf-8"?>
 <p:sld xmlns:a="http://schemas.openxmlformats.org/drawingml/2006/main" xmlns:r="http://schemas.openxmlformats.org/officeDocument/2006/relationships" xmlns:p="http://schemas.openxmlformats.org/presentationml/2006/main">
   <p:cSld>
@@ -4229,7 +4364,7 @@
           <p:cNvPr id="2" name="Title 1">
             <a:extLst>
               <a:ext uri="{FF2B5EF4-FFF2-40B4-BE49-F238E27FC236}">
-                <a16:creationId xmlns:a16="http://schemas.microsoft.com/office/drawing/2014/main" id="{630B28CF-9A9F-BB44-B219-CB5CE04F45F0}"/>
+                <a16:creationId xmlns:a16="http://schemas.microsoft.com/office/drawing/2014/main" id="{38F6EA6F-FB14-B04D-9768-28C456F7A8E9}"/>
               </a:ext>
             </a:extLst>
           </p:cNvPr>
@@ -4247,17 +4382,17 @@
           <a:p>
             <a:r>
               <a:rPr lang="en-US" dirty="0"/>
-              <a:t>For Next Week</a:t>
-            </a:r>
-          </a:p>
-        </p:txBody>
-      </p:sp>
-      <p:sp>
-        <p:nvSpPr>
-          <p:cNvPr id="3" name="Text Placeholder 2">
+              <a:t>Agenda</a:t>
+            </a:r>
+          </a:p>
+        </p:txBody>
+      </p:sp>
+      <p:sp>
+        <p:nvSpPr>
+          <p:cNvPr id="3" name="Content Placeholder 2">
             <a:extLst>
               <a:ext uri="{FF2B5EF4-FFF2-40B4-BE49-F238E27FC236}">
-                <a16:creationId xmlns:a16="http://schemas.microsoft.com/office/drawing/2014/main" id="{88282735-CB15-C446-86EE-E7142686654E}"/>
+                <a16:creationId xmlns:a16="http://schemas.microsoft.com/office/drawing/2014/main" id="{8A875008-7ECA-2A4D-BFC6-6413046F13E1}"/>
               </a:ext>
             </a:extLst>
           </p:cNvPr>
@@ -4265,22 +4400,139 @@
             <a:spLocks noGrp="1"/>
           </p:cNvSpPr>
           <p:nvPr>
-            <p:ph type="body" idx="1"/>
+            <p:ph sz="half" idx="1"/>
           </p:nvPr>
         </p:nvSpPr>
         <p:spPr/>
         <p:txBody>
-          <a:bodyPr/>
+          <a:bodyPr>
+            <a:normAutofit/>
+          </a:bodyPr>
           <a:lstStyle/>
           <a:p>
+            <a:r>
+              <a:rPr lang="en-US" dirty="0"/>
+              <a:t>Project 1 Review</a:t>
+            </a:r>
+          </a:p>
+          <a:p>
+            <a:r>
+              <a:rPr lang="en-US" dirty="0"/>
+              <a:t>Homework 3</a:t>
+            </a:r>
+          </a:p>
+          <a:p>
+            <a:r>
+              <a:rPr lang="en-US" dirty="0"/>
+              <a:t>Shapefiles in R</a:t>
+            </a:r>
+          </a:p>
+          <a:p>
+            <a:r>
+              <a:rPr lang="en-US" dirty="0"/>
+              <a:t>Leaflet</a:t>
+            </a:r>
+          </a:p>
+          <a:p>
+            <a:r>
+              <a:rPr lang="en-US" dirty="0" err="1"/>
+              <a:t>Basemaps</a:t>
+            </a:r>
             <a:endParaRPr lang="en-US" dirty="0"/>
+          </a:p>
+          <a:p>
+            <a:r>
+              <a:rPr lang="en-US" dirty="0"/>
+              <a:t>Lines</a:t>
+            </a:r>
+          </a:p>
+          <a:p>
+            <a:r>
+              <a:rPr lang="en-US" dirty="0"/>
+              <a:t>Shapes</a:t>
+            </a:r>
+          </a:p>
+          <a:p>
+            <a:r>
+              <a:rPr lang="en-US" dirty="0"/>
+              <a:t>Points</a:t>
+            </a:r>
+          </a:p>
+          <a:p>
+            <a:endParaRPr lang="en-US" dirty="0"/>
+          </a:p>
+        </p:txBody>
+      </p:sp>
+      <p:sp>
+        <p:nvSpPr>
+          <p:cNvPr id="4" name="Content Placeholder 3">
+            <a:extLst>
+              <a:ext uri="{FF2B5EF4-FFF2-40B4-BE49-F238E27FC236}">
+                <a16:creationId xmlns:a16="http://schemas.microsoft.com/office/drawing/2014/main" id="{319B700D-81E6-6F4C-B742-61128808AB7B}"/>
+              </a:ext>
+            </a:extLst>
+          </p:cNvPr>
+          <p:cNvSpPr>
+            <a:spLocks noGrp="1"/>
+          </p:cNvSpPr>
+          <p:nvPr>
+            <p:ph sz="half" idx="2"/>
+          </p:nvPr>
+        </p:nvSpPr>
+        <p:spPr/>
+        <p:txBody>
+          <a:bodyPr/>
+          <a:lstStyle/>
+          <a:p>
+            <a:r>
+              <a:rPr lang="en-US" dirty="0"/>
+              <a:t>Legends</a:t>
+            </a:r>
+          </a:p>
+          <a:p>
+            <a:r>
+              <a:rPr lang="en-US" dirty="0"/>
+              <a:t>Colors</a:t>
+            </a:r>
+          </a:p>
+          <a:p>
+            <a:r>
+              <a:rPr lang="en-US" dirty="0"/>
+              <a:t>Heatmaps</a:t>
+            </a:r>
+          </a:p>
+          <a:p>
+            <a:r>
+              <a:rPr lang="en-US" dirty="0"/>
+              <a:t>Add </a:t>
+            </a:r>
+            <a:r>
+              <a:rPr lang="en-US" dirty="0" err="1"/>
+              <a:t>Ons</a:t>
+            </a:r>
+            <a:r>
+              <a:rPr lang="en-US" dirty="0"/>
+              <a:t> &amp; Other things</a:t>
+            </a:r>
+          </a:p>
+          <a:p>
+            <a:r>
+              <a:rPr lang="en-US" dirty="0"/>
+              <a:t>Shiny integration</a:t>
+            </a:r>
+          </a:p>
+          <a:p>
+            <a:r>
+              <a:rPr lang="en-US" dirty="0"/>
+              <a:t>Leaflet Proxy</a:t>
+            </a:r>
           </a:p>
         </p:txBody>
       </p:sp>
     </p:spTree>
     <p:extLst>
       <p:ext uri="{BB962C8B-B14F-4D97-AF65-F5344CB8AC3E}">
-        <p14:creationId xmlns:p14="http://schemas.microsoft.com/office/powerpoint/2010/main" val="1211274615"/>
+        <p14:creationId xmlns:p14="http://schemas.microsoft.com/office/powerpoint/2010/main" val="4146018154"/>
       </p:ext>
     </p:extLst>
   </p:cSld>
@@ -4312,7 +4564,7 @@
           <p:cNvPr id="2" name="Title 1">
             <a:extLst>
               <a:ext uri="{FF2B5EF4-FFF2-40B4-BE49-F238E27FC236}">
-                <a16:creationId xmlns:a16="http://schemas.microsoft.com/office/drawing/2014/main" id="{3F871639-BB5F-F844-9FFA-3D37369566E3}"/>
+                <a16:creationId xmlns:a16="http://schemas.microsoft.com/office/drawing/2014/main" id="{DC54123F-79C1-7A4D-890B-CDE303DF17C2}"/>
               </a:ext>
             </a:extLst>
           </p:cNvPr>
@@ -4330,7 +4582,90 @@
           <a:p>
             <a:r>
               <a:rPr lang="en-US" dirty="0"/>
-              <a:t>Please be able to load the following libraries</a:t>
+              <a:t>Leaflet</a:t>
+            </a:r>
+          </a:p>
+        </p:txBody>
+      </p:sp>
+      <p:sp>
+        <p:nvSpPr>
+          <p:cNvPr id="3" name="Text Placeholder 2">
+            <a:extLst>
+              <a:ext uri="{FF2B5EF4-FFF2-40B4-BE49-F238E27FC236}">
+                <a16:creationId xmlns:a16="http://schemas.microsoft.com/office/drawing/2014/main" id="{3B486944-D159-754C-964D-2715CC8FC80C}"/>
+              </a:ext>
+            </a:extLst>
+          </p:cNvPr>
+          <p:cNvSpPr>
+            <a:spLocks noGrp="1"/>
+          </p:cNvSpPr>
+          <p:nvPr>
+            <p:ph type="body" idx="1"/>
+          </p:nvPr>
+        </p:nvSpPr>
+        <p:spPr/>
+        <p:txBody>
+          <a:bodyPr/>
+          <a:lstStyle/>
+          <a:p>
+            <a:endParaRPr lang="en-US"/>
+          </a:p>
+        </p:txBody>
+      </p:sp>
+    </p:spTree>
+    <p:extLst>
+      <p:ext uri="{BB962C8B-B14F-4D97-AF65-F5344CB8AC3E}">
+        <p14:creationId xmlns:p14="http://schemas.microsoft.com/office/powerpoint/2010/main" val="3374088551"/>
+      </p:ext>
+    </p:extLst>
+  </p:cSld>
+  <p:clrMapOvr>
+    <a:masterClrMapping/>
+  </p:clrMapOvr>
+</p:sld>
+</file>
+
+<file path=ppt/slides/slide4.xml><?xml version="1.0" encoding="utf-8"?>
+<p:sld xmlns:a="http://schemas.openxmlformats.org/drawingml/2006/main" xmlns:r="http://schemas.openxmlformats.org/officeDocument/2006/relationships" xmlns:p="http://schemas.openxmlformats.org/presentationml/2006/main">
+  <p:cSld>
+    <p:spTree>
+      <p:nvGrpSpPr>
+        <p:cNvPr id="1" name=""/>
+        <p:cNvGrpSpPr/>
+        <p:nvPr/>
+      </p:nvGrpSpPr>
+      <p:grpSpPr>
+        <a:xfrm>
+          <a:off x="0" y="0"/>
+          <a:ext cx="0" cy="0"/>
+          <a:chOff x="0" y="0"/>
+          <a:chExt cx="0" cy="0"/>
+        </a:xfrm>
+      </p:grpSpPr>
+      <p:sp>
+        <p:nvSpPr>
+          <p:cNvPr id="2" name="Title 1">
+            <a:extLst>
+              <a:ext uri="{FF2B5EF4-FFF2-40B4-BE49-F238E27FC236}">
+                <a16:creationId xmlns:a16="http://schemas.microsoft.com/office/drawing/2014/main" id="{19CAC71E-1006-9444-AB22-D1E616791347}"/>
+              </a:ext>
+            </a:extLst>
+          </p:cNvPr>
+          <p:cNvSpPr>
+            <a:spLocks noGrp="1"/>
+          </p:cNvSpPr>
+          <p:nvPr>
+            <p:ph type="title"/>
+          </p:nvPr>
+        </p:nvSpPr>
+        <p:spPr/>
+        <p:txBody>
+          <a:bodyPr/>
+          <a:lstStyle/>
+          <a:p>
+            <a:r>
+              <a:rPr lang="en-US" dirty="0"/>
+              <a:t>Making sure you have the right stuff</a:t>
             </a:r>
           </a:p>
         </p:txBody>
@@ -4340,7 +4675,7 @@
           <p:cNvPr id="3" name="Content Placeholder 2">
             <a:extLst>
               <a:ext uri="{FF2B5EF4-FFF2-40B4-BE49-F238E27FC236}">
-                <a16:creationId xmlns:a16="http://schemas.microsoft.com/office/drawing/2014/main" id="{B0ABF65C-A12F-8442-AD8B-4984D44E4488}"/>
+                <a16:creationId xmlns:a16="http://schemas.microsoft.com/office/drawing/2014/main" id="{D6321D6E-E954-A347-BDAD-CC57C2F7474B}"/>
               </a:ext>
             </a:extLst>
           </p:cNvPr>
@@ -4348,7 +4683,7 @@
             <a:spLocks noGrp="1"/>
           </p:cNvSpPr>
           <p:nvPr>
-            <p:ph sz="half" idx="1"/>
+            <p:ph idx="1"/>
           </p:nvPr>
         </p:nvSpPr>
         <p:spPr/>
@@ -4356,26 +4691,96 @@
           <a:bodyPr/>
           <a:lstStyle/>
           <a:p>
+            <a:pPr marL="0" indent="0">
+              <a:buNone/>
+            </a:pPr>
+            <a:r>
+              <a:rPr lang="en-US" dirty="0"/>
+              <a:t>Install these packages:</a:t>
+            </a:r>
+          </a:p>
+          <a:p>
             <a:r>
               <a:rPr lang="en-US" dirty="0" err="1"/>
-              <a:t>httr</a:t>
+              <a:t>rgdal</a:t>
+            </a:r>
+            <a:r>
+              <a:rPr lang="en-US" dirty="0"/>
+              <a:t>: </a:t>
+            </a:r>
+            <a:r>
+              <a:rPr lang="en-US" dirty="0">
+                <a:hlinkClick r:id="rId2"/>
+              </a:rPr>
+              <a:t>https://github.com/cran/rgdal/blob/master/inst/README</a:t>
             </a:r>
             <a:endParaRPr lang="en-US" dirty="0"/>
           </a:p>
           <a:p>
             <a:r>
+              <a:rPr lang="en-US" dirty="0" err="1"/>
+              <a:t>rgeos</a:t>
+            </a:r>
+            <a:endParaRPr lang="en-US" dirty="0"/>
+          </a:p>
+          <a:p>
+            <a:r>
+              <a:rPr lang="en-US" dirty="0" err="1"/>
+              <a:t>sp</a:t>
+            </a:r>
+            <a:endParaRPr lang="en-US" dirty="0"/>
+          </a:p>
+          <a:p>
+            <a:r>
               <a:rPr lang="en-US" dirty="0"/>
-              <a:t>Make API calls</a:t>
-            </a:r>
-          </a:p>
-        </p:txBody>
-      </p:sp>
-      <p:sp>
-        <p:nvSpPr>
-          <p:cNvPr id="4" name="Content Placeholder 3">
+              <a:t>leaflet</a:t>
+            </a:r>
+          </a:p>
+          <a:p>
+            <a:r>
+              <a:rPr lang="en-US" dirty="0" err="1"/>
+              <a:t>leaflet.extras</a:t>
+            </a:r>
+            <a:endParaRPr lang="en-US" dirty="0"/>
+          </a:p>
+        </p:txBody>
+      </p:sp>
+    </p:spTree>
+    <p:extLst>
+      <p:ext uri="{BB962C8B-B14F-4D97-AF65-F5344CB8AC3E}">
+        <p14:creationId xmlns:p14="http://schemas.microsoft.com/office/powerpoint/2010/main" val="2805429434"/>
+      </p:ext>
+    </p:extLst>
+  </p:cSld>
+  <p:clrMapOvr>
+    <a:masterClrMapping/>
+  </p:clrMapOvr>
+</p:sld>
+</file>
+
+<file path=ppt/slides/slide5.xml><?xml version="1.0" encoding="utf-8"?>
+<p:sld xmlns:a="http://schemas.openxmlformats.org/drawingml/2006/main" xmlns:r="http://schemas.openxmlformats.org/officeDocument/2006/relationships" xmlns:p="http://schemas.openxmlformats.org/presentationml/2006/main">
+  <p:cSld>
+    <p:spTree>
+      <p:nvGrpSpPr>
+        <p:cNvPr id="1" name=""/>
+        <p:cNvGrpSpPr/>
+        <p:nvPr/>
+      </p:nvGrpSpPr>
+      <p:grpSpPr>
+        <a:xfrm>
+          <a:off x="0" y="0"/>
+          <a:ext cx="0" cy="0"/>
+          <a:chOff x="0" y="0"/>
+          <a:chExt cx="0" cy="0"/>
+        </a:xfrm>
+      </p:grpSpPr>
+      <p:sp>
+        <p:nvSpPr>
+          <p:cNvPr id="2" name="Title 1">
             <a:extLst>
               <a:ext uri="{FF2B5EF4-FFF2-40B4-BE49-F238E27FC236}">
-                <a16:creationId xmlns:a16="http://schemas.microsoft.com/office/drawing/2014/main" id="{BAE8C708-EB2C-4D4C-98B8-BC0BF14A8E2E}"/>
+                <a16:creationId xmlns:a16="http://schemas.microsoft.com/office/drawing/2014/main" id="{163BD7A4-6256-A94B-83B6-647741AC98BB}"/>
               </a:ext>
             </a:extLst>
           </p:cNvPr>
@@ -4383,7 +4788,7 @@
             <a:spLocks noGrp="1"/>
           </p:cNvSpPr>
           <p:nvPr>
-            <p:ph sz="half" idx="2"/>
+            <p:ph type="title"/>
           </p:nvPr>
         </p:nvSpPr>
         <p:spPr/>
@@ -4392,23 +4797,419 @@
           <a:lstStyle/>
           <a:p>
             <a:r>
+              <a:rPr lang="en-US" dirty="0"/>
+              <a:t>What is Leaflet?</a:t>
+            </a:r>
+          </a:p>
+        </p:txBody>
+      </p:sp>
+      <p:sp>
+        <p:nvSpPr>
+          <p:cNvPr id="3" name="Content Placeholder 2">
+            <a:extLst>
+              <a:ext uri="{FF2B5EF4-FFF2-40B4-BE49-F238E27FC236}">
+                <a16:creationId xmlns:a16="http://schemas.microsoft.com/office/drawing/2014/main" id="{675465BD-10EE-0F42-92A6-1D0A3895713F}"/>
+              </a:ext>
+            </a:extLst>
+          </p:cNvPr>
+          <p:cNvSpPr>
+            <a:spLocks noGrp="1"/>
+          </p:cNvSpPr>
+          <p:nvPr>
+            <p:ph idx="1"/>
+          </p:nvPr>
+        </p:nvSpPr>
+        <p:spPr/>
+        <p:txBody>
+          <a:bodyPr/>
+          <a:lstStyle/>
+          <a:p>
+            <a:r>
+              <a:rPr lang="en-US" dirty="0"/>
+              <a:t>R version of the </a:t>
+            </a:r>
+            <a:r>
               <a:rPr lang="en-US" dirty="0" err="1"/>
-              <a:t>jsonlite</a:t>
+              <a:t>Javascript</a:t>
+            </a:r>
+            <a:r>
+              <a:rPr lang="en-US" dirty="0"/>
+              <a:t> API</a:t>
+            </a:r>
+          </a:p>
+          <a:p>
+            <a:r>
+              <a:rPr lang="en-US" dirty="0"/>
+              <a:t>One of the ways to get interactive maps</a:t>
+            </a:r>
+          </a:p>
+          <a:p>
+            <a:r>
+              <a:rPr lang="en-US" dirty="0"/>
+              <a:t>Others include: </a:t>
+            </a:r>
+            <a:r>
+              <a:rPr lang="en-US" dirty="0" err="1"/>
+              <a:t>tmap</a:t>
+            </a:r>
+            <a:r>
+              <a:rPr lang="en-US" dirty="0"/>
+              <a:t> &amp; </a:t>
+            </a:r>
+            <a:r>
+              <a:rPr lang="en-US" dirty="0" err="1"/>
+              <a:t>mapview</a:t>
             </a:r>
             <a:endParaRPr lang="en-US" dirty="0"/>
           </a:p>
           <a:p>
             <a:r>
-              <a:rPr lang="en-US" dirty="0"/>
-              <a:t>Easily load and read JSON objects in R</a:t>
-            </a:r>
+              <a:rPr lang="en-US" dirty="0">
+                <a:hlinkClick r:id="rId2"/>
+              </a:rPr>
+              <a:t>https://rstudio.github.io/leaflet/</a:t>
+            </a:r>
+            <a:endParaRPr lang="en-US" dirty="0"/>
+          </a:p>
+          <a:p>
+            <a:endParaRPr lang="en-US" dirty="0"/>
           </a:p>
         </p:txBody>
       </p:sp>
     </p:spTree>
     <p:extLst>
       <p:ext uri="{BB962C8B-B14F-4D97-AF65-F5344CB8AC3E}">
-        <p14:creationId xmlns:p14="http://schemas.microsoft.com/office/powerpoint/2010/main" val="2995080687"/>
+        <p14:creationId xmlns:p14="http://schemas.microsoft.com/office/powerpoint/2010/main" val="3904987979"/>
+      </p:ext>
+    </p:extLst>
+  </p:cSld>
+  <p:clrMapOvr>
+    <a:masterClrMapping/>
+  </p:clrMapOvr>
+</p:sld>
+</file>
+
+<file path=ppt/slides/slide6.xml><?xml version="1.0" encoding="utf-8"?>
+<p:sld xmlns:a="http://schemas.openxmlformats.org/drawingml/2006/main" xmlns:r="http://schemas.openxmlformats.org/officeDocument/2006/relationships" xmlns:p="http://schemas.openxmlformats.org/presentationml/2006/main">
+  <p:cSld>
+    <p:spTree>
+      <p:nvGrpSpPr>
+        <p:cNvPr id="1" name=""/>
+        <p:cNvGrpSpPr/>
+        <p:nvPr/>
+      </p:nvGrpSpPr>
+      <p:grpSpPr>
+        <a:xfrm>
+          <a:off x="0" y="0"/>
+          <a:ext cx="0" cy="0"/>
+          <a:chOff x="0" y="0"/>
+          <a:chExt cx="0" cy="0"/>
+        </a:xfrm>
+      </p:grpSpPr>
+      <p:sp>
+        <p:nvSpPr>
+          <p:cNvPr id="2" name="Title 1">
+            <a:extLst>
+              <a:ext uri="{FF2B5EF4-FFF2-40B4-BE49-F238E27FC236}">
+                <a16:creationId xmlns:a16="http://schemas.microsoft.com/office/drawing/2014/main" id="{933F032F-AA62-9C4E-81AD-BC39FDD4DC4B}"/>
+              </a:ext>
+            </a:extLst>
+          </p:cNvPr>
+          <p:cNvSpPr>
+            <a:spLocks noGrp="1"/>
+          </p:cNvSpPr>
+          <p:nvPr>
+            <p:ph type="title"/>
+          </p:nvPr>
+        </p:nvSpPr>
+        <p:spPr/>
+        <p:txBody>
+          <a:bodyPr/>
+          <a:lstStyle/>
+          <a:p>
+            <a:endParaRPr lang="en-US" dirty="0"/>
+          </a:p>
+        </p:txBody>
+      </p:sp>
+      <p:sp>
+        <p:nvSpPr>
+          <p:cNvPr id="3" name="Content Placeholder 2">
+            <a:extLst>
+              <a:ext uri="{FF2B5EF4-FFF2-40B4-BE49-F238E27FC236}">
+                <a16:creationId xmlns:a16="http://schemas.microsoft.com/office/drawing/2014/main" id="{34E5DE4F-BFC4-684D-B2D7-61C21F984AD4}"/>
+              </a:ext>
+            </a:extLst>
+          </p:cNvPr>
+          <p:cNvSpPr>
+            <a:spLocks noGrp="1"/>
+          </p:cNvSpPr>
+          <p:nvPr>
+            <p:ph idx="1"/>
+          </p:nvPr>
+        </p:nvSpPr>
+        <p:spPr/>
+        <p:txBody>
+          <a:bodyPr/>
+          <a:lstStyle/>
+          <a:p>
+            <a:endParaRPr lang="en-US"/>
+          </a:p>
+        </p:txBody>
+      </p:sp>
+    </p:spTree>
+    <p:extLst>
+      <p:ext uri="{BB962C8B-B14F-4D97-AF65-F5344CB8AC3E}">
+        <p14:creationId xmlns:p14="http://schemas.microsoft.com/office/powerpoint/2010/main" val="1303475575"/>
+      </p:ext>
+    </p:extLst>
+  </p:cSld>
+  <p:clrMapOvr>
+    <a:masterClrMapping/>
+  </p:clrMapOvr>
+</p:sld>
+</file>
+
+<file path=ppt/slides/slide7.xml><?xml version="1.0" encoding="utf-8"?>
+<p:sld xmlns:a="http://schemas.openxmlformats.org/drawingml/2006/main" xmlns:r="http://schemas.openxmlformats.org/officeDocument/2006/relationships" xmlns:p="http://schemas.openxmlformats.org/presentationml/2006/main">
+  <p:cSld>
+    <p:spTree>
+      <p:nvGrpSpPr>
+        <p:cNvPr id="1" name=""/>
+        <p:cNvGrpSpPr/>
+        <p:nvPr/>
+      </p:nvGrpSpPr>
+      <p:grpSpPr>
+        <a:xfrm>
+          <a:off x="0" y="0"/>
+          <a:ext cx="0" cy="0"/>
+          <a:chOff x="0" y="0"/>
+          <a:chExt cx="0" cy="0"/>
+        </a:xfrm>
+      </p:grpSpPr>
+      <p:sp>
+        <p:nvSpPr>
+          <p:cNvPr id="2" name="Title 1">
+            <a:extLst>
+              <a:ext uri="{FF2B5EF4-FFF2-40B4-BE49-F238E27FC236}">
+                <a16:creationId xmlns:a16="http://schemas.microsoft.com/office/drawing/2014/main" id="{C10713FD-8CF6-A940-B446-8DB8325767F4}"/>
+              </a:ext>
+            </a:extLst>
+          </p:cNvPr>
+          <p:cNvSpPr>
+            <a:spLocks noGrp="1"/>
+          </p:cNvSpPr>
+          <p:nvPr>
+            <p:ph type="title"/>
+          </p:nvPr>
+        </p:nvSpPr>
+        <p:spPr/>
+        <p:txBody>
+          <a:bodyPr/>
+          <a:lstStyle/>
+          <a:p>
+            <a:r>
+              <a:rPr lang="en-US" dirty="0"/>
+              <a:t>Getting Data in</a:t>
+            </a:r>
+          </a:p>
+        </p:txBody>
+      </p:sp>
+      <p:sp>
+        <p:nvSpPr>
+          <p:cNvPr id="3" name="Text Placeholder 2">
+            <a:extLst>
+              <a:ext uri="{FF2B5EF4-FFF2-40B4-BE49-F238E27FC236}">
+                <a16:creationId xmlns:a16="http://schemas.microsoft.com/office/drawing/2014/main" id="{CCB14A8A-E91A-CC4F-B006-9125608D9925}"/>
+              </a:ext>
+            </a:extLst>
+          </p:cNvPr>
+          <p:cNvSpPr>
+            <a:spLocks noGrp="1"/>
+          </p:cNvSpPr>
+          <p:nvPr>
+            <p:ph type="body" idx="1"/>
+          </p:nvPr>
+        </p:nvSpPr>
+        <p:spPr/>
+        <p:txBody>
+          <a:bodyPr/>
+          <a:lstStyle/>
+          <a:p>
+            <a:endParaRPr lang="en-US"/>
+          </a:p>
+        </p:txBody>
+      </p:sp>
+    </p:spTree>
+    <p:extLst>
+      <p:ext uri="{BB962C8B-B14F-4D97-AF65-F5344CB8AC3E}">
+        <p14:creationId xmlns:p14="http://schemas.microsoft.com/office/powerpoint/2010/main" val="3563342946"/>
+      </p:ext>
+    </p:extLst>
+  </p:cSld>
+  <p:clrMapOvr>
+    <a:masterClrMapping/>
+  </p:clrMapOvr>
+</p:sld>
+</file>
+
+<file path=ppt/slides/slide8.xml><?xml version="1.0" encoding="utf-8"?>
+<p:sld xmlns:a="http://schemas.openxmlformats.org/drawingml/2006/main" xmlns:r="http://schemas.openxmlformats.org/officeDocument/2006/relationships" xmlns:p="http://schemas.openxmlformats.org/presentationml/2006/main">
+  <p:cSld>
+    <p:spTree>
+      <p:nvGrpSpPr>
+        <p:cNvPr id="1" name=""/>
+        <p:cNvGrpSpPr/>
+        <p:nvPr/>
+      </p:nvGrpSpPr>
+      <p:grpSpPr>
+        <a:xfrm>
+          <a:off x="0" y="0"/>
+          <a:ext cx="0" cy="0"/>
+          <a:chOff x="0" y="0"/>
+          <a:chExt cx="0" cy="0"/>
+        </a:xfrm>
+      </p:grpSpPr>
+      <p:sp>
+        <p:nvSpPr>
+          <p:cNvPr id="2" name="Title 1">
+            <a:extLst>
+              <a:ext uri="{FF2B5EF4-FFF2-40B4-BE49-F238E27FC236}">
+                <a16:creationId xmlns:a16="http://schemas.microsoft.com/office/drawing/2014/main" id="{C10713FD-8CF6-A940-B446-8DB8325767F4}"/>
+              </a:ext>
+            </a:extLst>
+          </p:cNvPr>
+          <p:cNvSpPr>
+            <a:spLocks noGrp="1"/>
+          </p:cNvSpPr>
+          <p:nvPr>
+            <p:ph type="title"/>
+          </p:nvPr>
+        </p:nvSpPr>
+        <p:spPr/>
+        <p:txBody>
+          <a:bodyPr/>
+          <a:lstStyle/>
+          <a:p>
+            <a:r>
+              <a:rPr lang="en-US"/>
+              <a:t>Shapes</a:t>
+            </a:r>
+            <a:endParaRPr lang="en-US" dirty="0"/>
+          </a:p>
+        </p:txBody>
+      </p:sp>
+      <p:sp>
+        <p:nvSpPr>
+          <p:cNvPr id="3" name="Text Placeholder 2">
+            <a:extLst>
+              <a:ext uri="{FF2B5EF4-FFF2-40B4-BE49-F238E27FC236}">
+                <a16:creationId xmlns:a16="http://schemas.microsoft.com/office/drawing/2014/main" id="{CCB14A8A-E91A-CC4F-B006-9125608D9925}"/>
+              </a:ext>
+            </a:extLst>
+          </p:cNvPr>
+          <p:cNvSpPr>
+            <a:spLocks noGrp="1"/>
+          </p:cNvSpPr>
+          <p:nvPr>
+            <p:ph type="body" idx="1"/>
+          </p:nvPr>
+        </p:nvSpPr>
+        <p:spPr/>
+        <p:txBody>
+          <a:bodyPr/>
+          <a:lstStyle/>
+          <a:p>
+            <a:endParaRPr lang="en-US"/>
+          </a:p>
+        </p:txBody>
+      </p:sp>
+    </p:spTree>
+    <p:extLst>
+      <p:ext uri="{BB962C8B-B14F-4D97-AF65-F5344CB8AC3E}">
+        <p14:creationId xmlns:p14="http://schemas.microsoft.com/office/powerpoint/2010/main" val="3812106291"/>
+      </p:ext>
+    </p:extLst>
+  </p:cSld>
+  <p:clrMapOvr>
+    <a:masterClrMapping/>
+  </p:clrMapOvr>
+</p:sld>
+</file>
+
+<file path=ppt/slides/slide9.xml><?xml version="1.0" encoding="utf-8"?>
+<p:sld xmlns:a="http://schemas.openxmlformats.org/drawingml/2006/main" xmlns:r="http://schemas.openxmlformats.org/officeDocument/2006/relationships" xmlns:p="http://schemas.openxmlformats.org/presentationml/2006/main">
+  <p:cSld>
+    <p:spTree>
+      <p:nvGrpSpPr>
+        <p:cNvPr id="1" name=""/>
+        <p:cNvGrpSpPr/>
+        <p:nvPr/>
+      </p:nvGrpSpPr>
+      <p:grpSpPr>
+        <a:xfrm>
+          <a:off x="0" y="0"/>
+          <a:ext cx="0" cy="0"/>
+          <a:chOff x="0" y="0"/>
+          <a:chExt cx="0" cy="0"/>
+        </a:xfrm>
+      </p:grpSpPr>
+      <p:sp>
+        <p:nvSpPr>
+          <p:cNvPr id="2" name="Title 1">
+            <a:extLst>
+              <a:ext uri="{FF2B5EF4-FFF2-40B4-BE49-F238E27FC236}">
+                <a16:creationId xmlns:a16="http://schemas.microsoft.com/office/drawing/2014/main" id="{630B28CF-9A9F-BB44-B219-CB5CE04F45F0}"/>
+              </a:ext>
+            </a:extLst>
+          </p:cNvPr>
+          <p:cNvSpPr>
+            <a:spLocks noGrp="1"/>
+          </p:cNvSpPr>
+          <p:nvPr>
+            <p:ph type="title"/>
+          </p:nvPr>
+        </p:nvSpPr>
+        <p:spPr/>
+        <p:txBody>
+          <a:bodyPr/>
+          <a:lstStyle/>
+          <a:p>
+            <a:r>
+              <a:rPr lang="en-US" dirty="0"/>
+              <a:t>For Next Week</a:t>
+            </a:r>
+          </a:p>
+        </p:txBody>
+      </p:sp>
+      <p:sp>
+        <p:nvSpPr>
+          <p:cNvPr id="3" name="Text Placeholder 2">
+            <a:extLst>
+              <a:ext uri="{FF2B5EF4-FFF2-40B4-BE49-F238E27FC236}">
+                <a16:creationId xmlns:a16="http://schemas.microsoft.com/office/drawing/2014/main" id="{88282735-CB15-C446-86EE-E7142686654E}"/>
+              </a:ext>
+            </a:extLst>
+          </p:cNvPr>
+          <p:cNvSpPr>
+            <a:spLocks noGrp="1"/>
+          </p:cNvSpPr>
+          <p:nvPr>
+            <p:ph type="body" idx="1"/>
+          </p:nvPr>
+        </p:nvSpPr>
+        <p:spPr/>
+        <p:txBody>
+          <a:bodyPr/>
+          <a:lstStyle/>
+          <a:p>
+            <a:endParaRPr lang="en-US" dirty="0"/>
+          </a:p>
+        </p:txBody>
+      </p:sp>
+    </p:spTree>
+    <p:extLst>
+      <p:ext uri="{BB962C8B-B14F-4D97-AF65-F5344CB8AC3E}">
+        <p14:creationId xmlns:p14="http://schemas.microsoft.com/office/powerpoint/2010/main" val="1211274615"/>
       </p:ext>
     </p:extLst>
   </p:cSld>

</xml_diff>